<commit_message>
fixed flow big picture
</commit_message>
<xml_diff>
--- a/visualizations/flow-bigPicture.pptx
+++ b/visualizations/flow-bigPicture.pptx
@@ -289,7 +289,7 @@
             <a:fld id="{1D8BD707-D9CF-40AE-B4C6-C98DA3205C09}" type="datetimeFigureOut">
               <a:rPr lang="en-US" smtClean="0"/>
               <a:pPr/>
-              <a:t>1/10/2015</a:t>
+              <a:t>1/11/2015</a:t>
             </a:fld>
             <a:endParaRPr lang="en-US"/>
           </a:p>
@@ -456,7 +456,7 @@
             <a:fld id="{1D8BD707-D9CF-40AE-B4C6-C98DA3205C09}" type="datetimeFigureOut">
               <a:rPr lang="en-US" smtClean="0"/>
               <a:pPr/>
-              <a:t>1/10/2015</a:t>
+              <a:t>1/11/2015</a:t>
             </a:fld>
             <a:endParaRPr lang="en-US"/>
           </a:p>
@@ -633,7 +633,7 @@
             <a:fld id="{1D8BD707-D9CF-40AE-B4C6-C98DA3205C09}" type="datetimeFigureOut">
               <a:rPr lang="en-US" smtClean="0"/>
               <a:pPr/>
-              <a:t>1/10/2015</a:t>
+              <a:t>1/11/2015</a:t>
             </a:fld>
             <a:endParaRPr lang="en-US"/>
           </a:p>
@@ -800,7 +800,7 @@
             <a:fld id="{1D8BD707-D9CF-40AE-B4C6-C98DA3205C09}" type="datetimeFigureOut">
               <a:rPr lang="en-US" smtClean="0"/>
               <a:pPr/>
-              <a:t>1/10/2015</a:t>
+              <a:t>1/11/2015</a:t>
             </a:fld>
             <a:endParaRPr lang="en-US"/>
           </a:p>
@@ -1043,7 +1043,7 @@
             <a:fld id="{1D8BD707-D9CF-40AE-B4C6-C98DA3205C09}" type="datetimeFigureOut">
               <a:rPr lang="en-US" smtClean="0"/>
               <a:pPr/>
-              <a:t>1/10/2015</a:t>
+              <a:t>1/11/2015</a:t>
             </a:fld>
             <a:endParaRPr lang="en-US"/>
           </a:p>
@@ -1328,7 +1328,7 @@
             <a:fld id="{1D8BD707-D9CF-40AE-B4C6-C98DA3205C09}" type="datetimeFigureOut">
               <a:rPr lang="en-US" smtClean="0"/>
               <a:pPr/>
-              <a:t>1/10/2015</a:t>
+              <a:t>1/11/2015</a:t>
             </a:fld>
             <a:endParaRPr lang="en-US"/>
           </a:p>
@@ -1747,7 +1747,7 @@
             <a:fld id="{1D8BD707-D9CF-40AE-B4C6-C98DA3205C09}" type="datetimeFigureOut">
               <a:rPr lang="en-US" smtClean="0"/>
               <a:pPr/>
-              <a:t>1/10/2015</a:t>
+              <a:t>1/11/2015</a:t>
             </a:fld>
             <a:endParaRPr lang="en-US"/>
           </a:p>
@@ -1862,7 +1862,7 @@
             <a:fld id="{1D8BD707-D9CF-40AE-B4C6-C98DA3205C09}" type="datetimeFigureOut">
               <a:rPr lang="en-US" smtClean="0"/>
               <a:pPr/>
-              <a:t>1/10/2015</a:t>
+              <a:t>1/11/2015</a:t>
             </a:fld>
             <a:endParaRPr lang="en-US"/>
           </a:p>
@@ -1954,7 +1954,7 @@
             <a:fld id="{1D8BD707-D9CF-40AE-B4C6-C98DA3205C09}" type="datetimeFigureOut">
               <a:rPr lang="en-US" smtClean="0"/>
               <a:pPr/>
-              <a:t>1/10/2015</a:t>
+              <a:t>1/11/2015</a:t>
             </a:fld>
             <a:endParaRPr lang="en-US"/>
           </a:p>
@@ -2228,7 +2228,7 @@
             <a:fld id="{1D8BD707-D9CF-40AE-B4C6-C98DA3205C09}" type="datetimeFigureOut">
               <a:rPr lang="en-US" smtClean="0"/>
               <a:pPr/>
-              <a:t>1/10/2015</a:t>
+              <a:t>1/11/2015</a:t>
             </a:fld>
             <a:endParaRPr lang="en-US"/>
           </a:p>
@@ -2478,7 +2478,7 @@
             <a:fld id="{1D8BD707-D9CF-40AE-B4C6-C98DA3205C09}" type="datetimeFigureOut">
               <a:rPr lang="en-US" smtClean="0"/>
               <a:pPr/>
-              <a:t>1/10/2015</a:t>
+              <a:t>1/11/2015</a:t>
             </a:fld>
             <a:endParaRPr lang="en-US"/>
           </a:p>
@@ -2688,7 +2688,7 @@
             <a:fld id="{1D8BD707-D9CF-40AE-B4C6-C98DA3205C09}" type="datetimeFigureOut">
               <a:rPr lang="en-US" smtClean="0"/>
               <a:pPr/>
-              <a:t>1/10/2015</a:t>
+              <a:t>1/11/2015</a:t>
             </a:fld>
             <a:endParaRPr lang="en-US"/>
           </a:p>
@@ -3312,8 +3312,8 @@
         </p:nvSpPr>
         <p:spPr>
           <a:xfrm>
-            <a:off x="3932500" y="3124200"/>
-            <a:ext cx="1219200" cy="838200"/>
+            <a:off x="3932500" y="3158925"/>
+            <a:ext cx="1219200" cy="925975"/>
           </a:xfrm>
           <a:prstGeom prst="rect">
             <a:avLst/>
@@ -3357,7 +3357,15 @@
                   <a:sysClr val="windowText" lastClr="000000"/>
                 </a:solidFill>
               </a:rPr>
-              <a:t>Fit Model</a:t>
+              <a:t>Fit and Test </a:t>
+            </a:r>
+            <a:r>
+              <a:rPr lang="en-US" dirty="0" smtClean="0">
+                <a:solidFill>
+                  <a:sysClr val="windowText" lastClr="000000"/>
+                </a:solidFill>
+              </a:rPr>
+              <a:t>Model</a:t>
             </a:r>
             <a:endParaRPr lang="en-US" dirty="0">
               <a:solidFill>

</xml_diff>